<commit_message>
Change transition from H_OFF_DECR to H_OFF: < T_LOW instead of <= T_LOW. Prevents immediate transition from H_OFF to H_ON_INCR during next pass through the FSM.
</commit_message>
<xml_diff>
--- a/state_transition_diagram.pptx
+++ b/state_transition_diagram.pptx
@@ -288,7 +288,7 @@
           <a:p>
             <a:fld id="{8ACD2759-BD6F-40C3-A89C-94D8FF61B383}" type="datetimeFigureOut">
               <a:rPr lang="en-US" smtClean="0"/>
-              <a:t>1/1/2016</a:t>
+              <a:t>1/2/2016</a:t>
             </a:fld>
             <a:endParaRPr lang="en-US"/>
           </a:p>
@@ -458,7 +458,7 @@
           <a:p>
             <a:fld id="{8ACD2759-BD6F-40C3-A89C-94D8FF61B383}" type="datetimeFigureOut">
               <a:rPr lang="en-US" smtClean="0"/>
-              <a:t>1/1/2016</a:t>
+              <a:t>1/2/2016</a:t>
             </a:fld>
             <a:endParaRPr lang="en-US"/>
           </a:p>
@@ -638,7 +638,7 @@
           <a:p>
             <a:fld id="{8ACD2759-BD6F-40C3-A89C-94D8FF61B383}" type="datetimeFigureOut">
               <a:rPr lang="en-US" smtClean="0"/>
-              <a:t>1/1/2016</a:t>
+              <a:t>1/2/2016</a:t>
             </a:fld>
             <a:endParaRPr lang="en-US"/>
           </a:p>
@@ -808,7 +808,7 @@
           <a:p>
             <a:fld id="{8ACD2759-BD6F-40C3-A89C-94D8FF61B383}" type="datetimeFigureOut">
               <a:rPr lang="en-US" smtClean="0"/>
-              <a:t>1/1/2016</a:t>
+              <a:t>1/2/2016</a:t>
             </a:fld>
             <a:endParaRPr lang="en-US"/>
           </a:p>
@@ -1054,7 +1054,7 @@
           <a:p>
             <a:fld id="{8ACD2759-BD6F-40C3-A89C-94D8FF61B383}" type="datetimeFigureOut">
               <a:rPr lang="en-US" smtClean="0"/>
-              <a:t>1/1/2016</a:t>
+              <a:t>1/2/2016</a:t>
             </a:fld>
             <a:endParaRPr lang="en-US"/>
           </a:p>
@@ -1342,7 +1342,7 @@
           <a:p>
             <a:fld id="{8ACD2759-BD6F-40C3-A89C-94D8FF61B383}" type="datetimeFigureOut">
               <a:rPr lang="en-US" smtClean="0"/>
-              <a:t>1/1/2016</a:t>
+              <a:t>1/2/2016</a:t>
             </a:fld>
             <a:endParaRPr lang="en-US"/>
           </a:p>
@@ -1764,7 +1764,7 @@
           <a:p>
             <a:fld id="{8ACD2759-BD6F-40C3-A89C-94D8FF61B383}" type="datetimeFigureOut">
               <a:rPr lang="en-US" smtClean="0"/>
-              <a:t>1/1/2016</a:t>
+              <a:t>1/2/2016</a:t>
             </a:fld>
             <a:endParaRPr lang="en-US"/>
           </a:p>
@@ -1882,7 +1882,7 @@
           <a:p>
             <a:fld id="{8ACD2759-BD6F-40C3-A89C-94D8FF61B383}" type="datetimeFigureOut">
               <a:rPr lang="en-US" smtClean="0"/>
-              <a:t>1/1/2016</a:t>
+              <a:t>1/2/2016</a:t>
             </a:fld>
             <a:endParaRPr lang="en-US"/>
           </a:p>
@@ -1977,7 +1977,7 @@
           <a:p>
             <a:fld id="{8ACD2759-BD6F-40C3-A89C-94D8FF61B383}" type="datetimeFigureOut">
               <a:rPr lang="en-US" smtClean="0"/>
-              <a:t>1/1/2016</a:t>
+              <a:t>1/2/2016</a:t>
             </a:fld>
             <a:endParaRPr lang="en-US"/>
           </a:p>
@@ -2254,7 +2254,7 @@
           <a:p>
             <a:fld id="{8ACD2759-BD6F-40C3-A89C-94D8FF61B383}" type="datetimeFigureOut">
               <a:rPr lang="en-US" smtClean="0"/>
-              <a:t>1/1/2016</a:t>
+              <a:t>1/2/2016</a:t>
             </a:fld>
             <a:endParaRPr lang="en-US"/>
           </a:p>
@@ -2507,7 +2507,7 @@
           <a:p>
             <a:fld id="{8ACD2759-BD6F-40C3-A89C-94D8FF61B383}" type="datetimeFigureOut">
               <a:rPr lang="en-US" smtClean="0"/>
-              <a:t>1/1/2016</a:t>
+              <a:t>1/2/2016</a:t>
             </a:fld>
             <a:endParaRPr lang="en-US"/>
           </a:p>
@@ -2720,7 +2720,7 @@
           <a:p>
             <a:fld id="{8ACD2759-BD6F-40C3-A89C-94D8FF61B383}" type="datetimeFigureOut">
               <a:rPr lang="en-US" smtClean="0"/>
-              <a:t>1/1/2016</a:t>
+              <a:t>1/2/2016</a:t>
             </a:fld>
             <a:endParaRPr lang="en-US"/>
           </a:p>
@@ -4114,7 +4114,15 @@
           <a:p>
             <a:r>
               <a:rPr lang="en-US" sz="1000" dirty="0" smtClean="0"/>
-              <a:t>temp ≤ T-LO</a:t>
+              <a:t>temp </a:t>
+            </a:r>
+            <a:r>
+              <a:rPr lang="en-US" sz="1000" dirty="0" smtClean="0"/>
+              <a:t>&lt; </a:t>
+            </a:r>
+            <a:r>
+              <a:rPr lang="en-US" sz="1000" dirty="0" smtClean="0"/>
+              <a:t>T-LO</a:t>
             </a:r>
           </a:p>
         </p:txBody>

</xml_diff>